<commit_message>
update QwenAgent architecture analysis PPT
Signed-off-by: Haoyu Liu <liuhaoyutz@126.com>
</commit_message>
<xml_diff>
--- a/QwenAgent架构分析.pptx
+++ b/QwenAgent架构分析.pptx
@@ -3590,7 +3590,19 @@
           <a:bodyPr/>
           <a:lstStyle/>
           <a:p>
-            <a:endParaRPr lang="zh-CN" altLang="en-US"/>
+            <a:r>
+              <a:rPr lang="zh-CN" altLang="en-US"/>
+              <a:t>刘昊昱</a:t>
+            </a:r>
+            <a:r>
+              <a:rPr lang="en-US" altLang="zh-CN"/>
+              <a:t> </a:t>
+            </a:r>
+            <a:r>
+              <a:rPr lang="x-none" altLang="en-US"/>
+              <a:t> 2025-03-17</a:t>
+            </a:r>
+            <a:endParaRPr lang="x-none" altLang="en-US"/>
           </a:p>
         </p:txBody>
       </p:sp>

</xml_diff>